<commit_message>
Add lection 3 prototype.
</commit_message>
<xml_diff>
--- a/lections/lesson02/Lection 2.pptx
+++ b/lections/lesson02/Lection 2.pptx
@@ -6,27 +6,32 @@
   </p:sldMasterIdLst>
   <p:sldIdLst>
     <p:sldId id="256" r:id="rId2"/>
-    <p:sldId id="287" r:id="rId3"/>
-    <p:sldId id="289" r:id="rId4"/>
-    <p:sldId id="312" r:id="rId5"/>
-    <p:sldId id="290" r:id="rId6"/>
-    <p:sldId id="299" r:id="rId7"/>
-    <p:sldId id="268" r:id="rId8"/>
-    <p:sldId id="295" r:id="rId9"/>
-    <p:sldId id="269" r:id="rId10"/>
-    <p:sldId id="293" r:id="rId11"/>
-    <p:sldId id="296" r:id="rId12"/>
-    <p:sldId id="307" r:id="rId13"/>
-    <p:sldId id="301" r:id="rId14"/>
-    <p:sldId id="304" r:id="rId15"/>
-    <p:sldId id="297" r:id="rId16"/>
-    <p:sldId id="298" r:id="rId17"/>
-    <p:sldId id="308" r:id="rId18"/>
-    <p:sldId id="302" r:id="rId19"/>
-    <p:sldId id="303" r:id="rId20"/>
-    <p:sldId id="305" r:id="rId21"/>
-    <p:sldId id="300" r:id="rId22"/>
-    <p:sldId id="311" r:id="rId23"/>
+    <p:sldId id="313" r:id="rId3"/>
+    <p:sldId id="287" r:id="rId4"/>
+    <p:sldId id="289" r:id="rId5"/>
+    <p:sldId id="312" r:id="rId6"/>
+    <p:sldId id="290" r:id="rId7"/>
+    <p:sldId id="299" r:id="rId8"/>
+    <p:sldId id="268" r:id="rId9"/>
+    <p:sldId id="295" r:id="rId10"/>
+    <p:sldId id="269" r:id="rId11"/>
+    <p:sldId id="293" r:id="rId12"/>
+    <p:sldId id="296" r:id="rId13"/>
+    <p:sldId id="307" r:id="rId14"/>
+    <p:sldId id="301" r:id="rId15"/>
+    <p:sldId id="304" r:id="rId16"/>
+    <p:sldId id="297" r:id="rId17"/>
+    <p:sldId id="298" r:id="rId18"/>
+    <p:sldId id="308" r:id="rId19"/>
+    <p:sldId id="302" r:id="rId20"/>
+    <p:sldId id="303" r:id="rId21"/>
+    <p:sldId id="305" r:id="rId22"/>
+    <p:sldId id="300" r:id="rId23"/>
+    <p:sldId id="311" r:id="rId24"/>
+    <p:sldId id="316" r:id="rId25"/>
+    <p:sldId id="314" r:id="rId26"/>
+    <p:sldId id="317" r:id="rId27"/>
+    <p:sldId id="318" r:id="rId28"/>
   </p:sldIdLst>
   <p:sldSz cx="9144000" cy="6858000" type="screen4x3"/>
   <p:notesSz cx="6858000" cy="9144000"/>
@@ -309,7 +314,7 @@
           <a:p>
             <a:fld id="{14EFE6F2-8BA5-4871-A0B7-00A7BEFBBD86}" type="datetimeFigureOut">
               <a:rPr lang="ru-RU" smtClean="0"/>
-              <a:t>12.02.2014</a:t>
+              <a:t>13.02.2014</a:t>
             </a:fld>
             <a:endParaRPr lang="ru-RU"/>
           </a:p>
@@ -479,7 +484,7 @@
           <a:p>
             <a:fld id="{14EFE6F2-8BA5-4871-A0B7-00A7BEFBBD86}" type="datetimeFigureOut">
               <a:rPr lang="ru-RU" smtClean="0"/>
-              <a:t>12.02.2014</a:t>
+              <a:t>13.02.2014</a:t>
             </a:fld>
             <a:endParaRPr lang="ru-RU"/>
           </a:p>
@@ -659,7 +664,7 @@
           <a:p>
             <a:fld id="{14EFE6F2-8BA5-4871-A0B7-00A7BEFBBD86}" type="datetimeFigureOut">
               <a:rPr lang="ru-RU" smtClean="0"/>
-              <a:t>12.02.2014</a:t>
+              <a:t>13.02.2014</a:t>
             </a:fld>
             <a:endParaRPr lang="ru-RU"/>
           </a:p>
@@ -829,7 +834,7 @@
           <a:p>
             <a:fld id="{14EFE6F2-8BA5-4871-A0B7-00A7BEFBBD86}" type="datetimeFigureOut">
               <a:rPr lang="ru-RU" smtClean="0"/>
-              <a:t>12.02.2014</a:t>
+              <a:t>13.02.2014</a:t>
             </a:fld>
             <a:endParaRPr lang="ru-RU"/>
           </a:p>
@@ -1075,7 +1080,7 @@
           <a:p>
             <a:fld id="{14EFE6F2-8BA5-4871-A0B7-00A7BEFBBD86}" type="datetimeFigureOut">
               <a:rPr lang="ru-RU" smtClean="0"/>
-              <a:t>12.02.2014</a:t>
+              <a:t>13.02.2014</a:t>
             </a:fld>
             <a:endParaRPr lang="ru-RU"/>
           </a:p>
@@ -1363,7 +1368,7 @@
           <a:p>
             <a:fld id="{14EFE6F2-8BA5-4871-A0B7-00A7BEFBBD86}" type="datetimeFigureOut">
               <a:rPr lang="ru-RU" smtClean="0"/>
-              <a:t>12.02.2014</a:t>
+              <a:t>13.02.2014</a:t>
             </a:fld>
             <a:endParaRPr lang="ru-RU"/>
           </a:p>
@@ -1785,7 +1790,7 @@
           <a:p>
             <a:fld id="{14EFE6F2-8BA5-4871-A0B7-00A7BEFBBD86}" type="datetimeFigureOut">
               <a:rPr lang="ru-RU" smtClean="0"/>
-              <a:t>12.02.2014</a:t>
+              <a:t>13.02.2014</a:t>
             </a:fld>
             <a:endParaRPr lang="ru-RU"/>
           </a:p>
@@ -1903,7 +1908,7 @@
           <a:p>
             <a:fld id="{14EFE6F2-8BA5-4871-A0B7-00A7BEFBBD86}" type="datetimeFigureOut">
               <a:rPr lang="ru-RU" smtClean="0"/>
-              <a:t>12.02.2014</a:t>
+              <a:t>13.02.2014</a:t>
             </a:fld>
             <a:endParaRPr lang="ru-RU"/>
           </a:p>
@@ -1998,7 +2003,7 @@
           <a:p>
             <a:fld id="{14EFE6F2-8BA5-4871-A0B7-00A7BEFBBD86}" type="datetimeFigureOut">
               <a:rPr lang="ru-RU" smtClean="0"/>
-              <a:t>12.02.2014</a:t>
+              <a:t>13.02.2014</a:t>
             </a:fld>
             <a:endParaRPr lang="ru-RU"/>
           </a:p>
@@ -2275,7 +2280,7 @@
           <a:p>
             <a:fld id="{14EFE6F2-8BA5-4871-A0B7-00A7BEFBBD86}" type="datetimeFigureOut">
               <a:rPr lang="ru-RU" smtClean="0"/>
-              <a:t>12.02.2014</a:t>
+              <a:t>13.02.2014</a:t>
             </a:fld>
             <a:endParaRPr lang="ru-RU"/>
           </a:p>
@@ -2528,7 +2533,7 @@
           <a:p>
             <a:fld id="{14EFE6F2-8BA5-4871-A0B7-00A7BEFBBD86}" type="datetimeFigureOut">
               <a:rPr lang="ru-RU" smtClean="0"/>
-              <a:t>12.02.2014</a:t>
+              <a:t>13.02.2014</a:t>
             </a:fld>
             <a:endParaRPr lang="ru-RU"/>
           </a:p>
@@ -2741,7 +2746,7 @@
           <a:p>
             <a:fld id="{14EFE6F2-8BA5-4871-A0B7-00A7BEFBBD86}" type="datetimeFigureOut">
               <a:rPr lang="ru-RU" smtClean="0"/>
-              <a:t>12.02.2014</a:t>
+              <a:t>13.02.2014</a:t>
             </a:fld>
             <a:endParaRPr lang="ru-RU"/>
           </a:p>
@@ -3164,6 +3169,13 @@
               <a:rPr lang="ru-RU" dirty="0" err="1" smtClean="0"/>
               <a:t>Смольянинов</a:t>
             </a:r>
+            <a:endParaRPr lang="ru-RU" dirty="0" smtClean="0"/>
+          </a:p>
+          <a:p>
+            <a:r>
+              <a:rPr lang="en-US" dirty="0" smtClean="0"/>
+              <a:t>mailto: smoly.kuzstu@gmail.com</a:t>
+            </a:r>
             <a:endParaRPr lang="ru-RU" dirty="0"/>
           </a:p>
         </p:txBody>
@@ -3217,6 +3229,403 @@
         </p:nvSpPr>
         <p:spPr/>
         <p:txBody>
+          <a:bodyPr/>
+          <a:lstStyle/>
+          <a:p>
+            <a:r>
+              <a:rPr lang="ru-RU" dirty="0" smtClean="0"/>
+              <a:t>Пример автозагрузки классов</a:t>
+            </a:r>
+            <a:endParaRPr lang="ru-RU" dirty="0"/>
+          </a:p>
+        </p:txBody>
+      </p:sp>
+      <p:sp>
+        <p:nvSpPr>
+          <p:cNvPr id="3" name="Объект 2"/>
+          <p:cNvSpPr>
+            <a:spLocks noGrp="1"/>
+          </p:cNvSpPr>
+          <p:nvPr>
+            <p:ph idx="1"/>
+          </p:nvPr>
+        </p:nvSpPr>
+        <p:spPr/>
+        <p:txBody>
+          <a:bodyPr>
+            <a:normAutofit/>
+          </a:bodyPr>
+          <a:lstStyle/>
+          <a:p>
+            <a:pPr marL="0" indent="0">
+              <a:buNone/>
+            </a:pPr>
+            <a:r>
+              <a:rPr lang="en-US" sz="2800" dirty="0" err="1" smtClean="0"/>
+              <a:t>src</a:t>
+            </a:r>
+            <a:r>
+              <a:rPr lang="en-US" sz="2800" dirty="0" smtClean="0"/>
+              <a:t>\</a:t>
+            </a:r>
+            <a:r>
+              <a:rPr lang="en-US" sz="2800" dirty="0" err="1" smtClean="0"/>
+              <a:t>Kuzstu</a:t>
+            </a:r>
+            <a:r>
+              <a:rPr lang="en-US" sz="2800" dirty="0" smtClean="0"/>
+              <a:t>\</a:t>
+            </a:r>
+            <a:r>
+              <a:rPr lang="en-US" sz="2800" dirty="0" err="1" smtClean="0"/>
+              <a:t>BlogBundle</a:t>
+            </a:r>
+            <a:r>
+              <a:rPr lang="en-US" sz="2800" dirty="0" smtClean="0"/>
+              <a:t>\Model</a:t>
+            </a:r>
+            <a:r>
+              <a:rPr lang="ru-RU" sz="2800" dirty="0" smtClean="0"/>
+              <a:t>\</a:t>
+            </a:r>
+            <a:r>
+              <a:rPr lang="en-US" sz="2800" dirty="0" err="1" smtClean="0"/>
+              <a:t>BaseModel.php</a:t>
+            </a:r>
+            <a:endParaRPr lang="en-US" sz="2800" dirty="0" smtClean="0"/>
+          </a:p>
+          <a:p>
+            <a:pPr marL="0" indent="0">
+              <a:buNone/>
+            </a:pPr>
+            <a:endParaRPr lang="en-US" sz="2800" dirty="0">
+              <a:solidFill>
+                <a:schemeClr val="accent1"/>
+              </a:solidFill>
+            </a:endParaRPr>
+          </a:p>
+          <a:p>
+            <a:pPr marL="0" indent="0">
+              <a:buNone/>
+            </a:pPr>
+            <a:r>
+              <a:rPr lang="en-US" sz="2800" dirty="0" err="1" smtClean="0">
+                <a:solidFill>
+                  <a:schemeClr val="accent1"/>
+                </a:solidFill>
+              </a:rPr>
+              <a:t>Kuzstu</a:t>
+            </a:r>
+            <a:r>
+              <a:rPr lang="en-US" sz="2800" dirty="0" smtClean="0">
+                <a:solidFill>
+                  <a:schemeClr val="accent1"/>
+                </a:solidFill>
+              </a:rPr>
+              <a:t>\</a:t>
+            </a:r>
+            <a:r>
+              <a:rPr lang="en-US" sz="2800" dirty="0" err="1" smtClean="0">
+                <a:solidFill>
+                  <a:schemeClr val="accent1"/>
+                </a:solidFill>
+              </a:rPr>
+              <a:t>BlogBundle</a:t>
+            </a:r>
+            <a:r>
+              <a:rPr lang="en-US" sz="2800" dirty="0" smtClean="0">
+                <a:solidFill>
+                  <a:schemeClr val="accent1"/>
+                </a:solidFill>
+              </a:rPr>
+              <a:t>\Model\</a:t>
+            </a:r>
+            <a:r>
+              <a:rPr lang="en-US" sz="2800" dirty="0" err="1" smtClean="0">
+                <a:solidFill>
+                  <a:schemeClr val="accent6">
+                    <a:lumMod val="75000"/>
+                  </a:schemeClr>
+                </a:solidFill>
+              </a:rPr>
+              <a:t>BaseModel.</a:t>
+            </a:r>
+            <a:r>
+              <a:rPr lang="en-US" sz="2800" dirty="0" err="1" smtClean="0"/>
+              <a:t>php</a:t>
+            </a:r>
+            <a:endParaRPr lang="ru-RU" sz="2800" dirty="0" smtClean="0"/>
+          </a:p>
+          <a:p>
+            <a:pPr marL="400050" lvl="1" indent="0">
+              <a:buNone/>
+            </a:pPr>
+            <a:r>
+              <a:rPr lang="en-US" sz="2400" dirty="0">
+                <a:solidFill>
+                  <a:schemeClr val="accent1"/>
+                </a:solidFill>
+              </a:rPr>
+              <a:t>namespace </a:t>
+            </a:r>
+            <a:r>
+              <a:rPr lang="en-US" sz="2400" dirty="0" err="1" smtClean="0"/>
+              <a:t>Kuzstu</a:t>
+            </a:r>
+            <a:r>
+              <a:rPr lang="en-US" sz="2400" dirty="0" smtClean="0"/>
+              <a:t>\</a:t>
+            </a:r>
+            <a:r>
+              <a:rPr lang="en-US" sz="2400" dirty="0" err="1" smtClean="0"/>
+              <a:t>BlogBundle</a:t>
+            </a:r>
+            <a:r>
+              <a:rPr lang="en-US" sz="2400" dirty="0" smtClean="0"/>
+              <a:t>\Model</a:t>
+            </a:r>
+            <a:endParaRPr lang="ru-RU" sz="2400" dirty="0" smtClean="0"/>
+          </a:p>
+          <a:p>
+            <a:pPr marL="800100" lvl="2" indent="0">
+              <a:buNone/>
+            </a:pPr>
+            <a:r>
+              <a:rPr lang="en-US" sz="2000" dirty="0"/>
+              <a:t>Class </a:t>
+            </a:r>
+            <a:r>
+              <a:rPr lang="en-US" sz="2000" dirty="0" err="1" smtClean="0">
+                <a:solidFill>
+                  <a:schemeClr val="accent6">
+                    <a:lumMod val="75000"/>
+                  </a:schemeClr>
+                </a:solidFill>
+              </a:rPr>
+              <a:t>BaseModel</a:t>
+            </a:r>
+            <a:endParaRPr lang="ru-RU" sz="2000" dirty="0" smtClean="0">
+              <a:solidFill>
+                <a:schemeClr val="accent6">
+                  <a:lumMod val="75000"/>
+                </a:schemeClr>
+              </a:solidFill>
+            </a:endParaRPr>
+          </a:p>
+          <a:p>
+            <a:pPr marL="800100" lvl="2" indent="0">
+              <a:buNone/>
+            </a:pPr>
+            <a:endParaRPr lang="ru-RU" sz="2000" dirty="0">
+              <a:solidFill>
+                <a:schemeClr val="accent6">
+                  <a:lumMod val="75000"/>
+                </a:schemeClr>
+              </a:solidFill>
+            </a:endParaRPr>
+          </a:p>
+          <a:p>
+            <a:pPr marL="0" indent="0">
+              <a:buNone/>
+            </a:pPr>
+            <a:r>
+              <a:rPr lang="en-US" sz="2400" strike="sngStrike" dirty="0" err="1" smtClean="0">
+                <a:solidFill>
+                  <a:schemeClr val="accent6">
+                    <a:lumMod val="75000"/>
+                  </a:schemeClr>
+                </a:solidFill>
+              </a:rPr>
+              <a:t>require_once</a:t>
+            </a:r>
+            <a:r>
+              <a:rPr lang="en-US" sz="2400" strike="sngStrike" dirty="0" smtClean="0">
+                <a:solidFill>
+                  <a:schemeClr val="accent6">
+                    <a:lumMod val="75000"/>
+                  </a:schemeClr>
+                </a:solidFill>
+              </a:rPr>
+              <a:t> “</a:t>
+            </a:r>
+            <a:r>
+              <a:rPr lang="en-US" sz="2400" strike="sngStrike" dirty="0" err="1" smtClean="0"/>
+              <a:t>src</a:t>
+            </a:r>
+            <a:r>
+              <a:rPr lang="en-US" sz="2400" strike="sngStrike" dirty="0" smtClean="0"/>
+              <a:t>\</a:t>
+            </a:r>
+            <a:r>
+              <a:rPr lang="en-US" sz="2400" strike="sngStrike" dirty="0" err="1" smtClean="0"/>
+              <a:t>Kuzstu</a:t>
+            </a:r>
+            <a:r>
+              <a:rPr lang="en-US" sz="2400" strike="sngStrike" dirty="0" smtClean="0"/>
+              <a:t>\</a:t>
+            </a:r>
+            <a:r>
+              <a:rPr lang="en-US" sz="2400" strike="sngStrike" dirty="0" err="1" smtClean="0"/>
+              <a:t>BlogBundle</a:t>
+            </a:r>
+            <a:r>
+              <a:rPr lang="en-US" sz="2400" strike="sngStrike" dirty="0" smtClean="0"/>
+              <a:t>\Model</a:t>
+            </a:r>
+            <a:r>
+              <a:rPr lang="ru-RU" sz="2400" strike="sngStrike" dirty="0"/>
+              <a:t>\</a:t>
+            </a:r>
+            <a:r>
+              <a:rPr lang="en-US" sz="2400" strike="sngStrike" dirty="0" err="1" smtClean="0"/>
+              <a:t>BaseModel.php</a:t>
+            </a:r>
+            <a:r>
+              <a:rPr lang="en-US" sz="2400" strike="sngStrike" dirty="0" smtClean="0">
+                <a:solidFill>
+                  <a:schemeClr val="accent6">
+                    <a:lumMod val="75000"/>
+                  </a:schemeClr>
+                </a:solidFill>
+              </a:rPr>
+              <a:t>”</a:t>
+            </a:r>
+          </a:p>
+          <a:p>
+            <a:pPr marL="0" indent="0">
+              <a:buNone/>
+            </a:pPr>
+            <a:r>
+              <a:rPr lang="en-US" sz="2400" dirty="0" smtClean="0">
+                <a:solidFill>
+                  <a:schemeClr val="accent6">
+                    <a:lumMod val="75000"/>
+                  </a:schemeClr>
+                </a:solidFill>
+              </a:rPr>
+              <a:t>$model = new \</a:t>
+            </a:r>
+            <a:r>
+              <a:rPr lang="en-US" sz="2400" dirty="0" err="1" smtClean="0">
+                <a:solidFill>
+                  <a:schemeClr val="accent1"/>
+                </a:solidFill>
+              </a:rPr>
+              <a:t>Kuzstu</a:t>
+            </a:r>
+            <a:r>
+              <a:rPr lang="en-US" sz="2400" dirty="0" smtClean="0">
+                <a:solidFill>
+                  <a:schemeClr val="accent1"/>
+                </a:solidFill>
+              </a:rPr>
+              <a:t>\</a:t>
+            </a:r>
+            <a:r>
+              <a:rPr lang="en-US" sz="2400" dirty="0" err="1" smtClean="0">
+                <a:solidFill>
+                  <a:schemeClr val="accent1"/>
+                </a:solidFill>
+              </a:rPr>
+              <a:t>BlogBundle</a:t>
+            </a:r>
+            <a:r>
+              <a:rPr lang="en-US" sz="2400" dirty="0" smtClean="0">
+                <a:solidFill>
+                  <a:schemeClr val="accent1"/>
+                </a:solidFill>
+              </a:rPr>
+              <a:t>\Model\</a:t>
+            </a:r>
+            <a:r>
+              <a:rPr lang="en-US" sz="2400" dirty="0" err="1" smtClean="0">
+                <a:solidFill>
+                  <a:schemeClr val="accent6">
+                    <a:lumMod val="75000"/>
+                  </a:schemeClr>
+                </a:solidFill>
+              </a:rPr>
+              <a:t>BaseModel</a:t>
+            </a:r>
+            <a:r>
+              <a:rPr lang="ru-RU" sz="2400" dirty="0" smtClean="0">
+                <a:solidFill>
+                  <a:schemeClr val="accent6">
+                    <a:lumMod val="75000"/>
+                  </a:schemeClr>
+                </a:solidFill>
+              </a:rPr>
+              <a:t>()</a:t>
+            </a:r>
+            <a:r>
+              <a:rPr lang="en-US" sz="2400" dirty="0" smtClean="0">
+                <a:solidFill>
+                  <a:schemeClr val="accent6">
+                    <a:lumMod val="75000"/>
+                  </a:schemeClr>
+                </a:solidFill>
+              </a:rPr>
+              <a:t>;</a:t>
+            </a:r>
+            <a:endParaRPr lang="ru-RU" sz="2400" dirty="0" smtClean="0">
+              <a:solidFill>
+                <a:schemeClr val="accent6">
+                  <a:lumMod val="75000"/>
+                </a:schemeClr>
+              </a:solidFill>
+            </a:endParaRPr>
+          </a:p>
+        </p:txBody>
+      </p:sp>
+    </p:spTree>
+    <p:extLst>
+      <p:ext uri="{BB962C8B-B14F-4D97-AF65-F5344CB8AC3E}">
+        <p14:creationId xmlns:p14="http://schemas.microsoft.com/office/powerpoint/2010/main" val="2836123550"/>
+      </p:ext>
+    </p:extLst>
+  </p:cSld>
+  <p:clrMapOvr>
+    <a:masterClrMapping/>
+  </p:clrMapOvr>
+  <p:timing>
+    <p:tnLst>
+      <p:par>
+        <p:cTn id="1" dur="indefinite" restart="never" nodeType="tmRoot"/>
+      </p:par>
+    </p:tnLst>
+  </p:timing>
+</p:sld>
+</file>
+
+<file path=ppt/slides/slide11.xml><?xml version="1.0" encoding="utf-8"?>
+<p:sld xmlns:a="http://schemas.openxmlformats.org/drawingml/2006/main" xmlns:r="http://schemas.openxmlformats.org/officeDocument/2006/relationships" xmlns:p="http://schemas.openxmlformats.org/presentationml/2006/main">
+  <p:cSld>
+    <p:spTree>
+      <p:nvGrpSpPr>
+        <p:cNvPr id="1" name=""/>
+        <p:cNvGrpSpPr/>
+        <p:nvPr/>
+      </p:nvGrpSpPr>
+      <p:grpSpPr>
+        <a:xfrm>
+          <a:off x="0" y="0"/>
+          <a:ext cx="0" cy="0"/>
+          <a:chOff x="0" y="0"/>
+          <a:chExt cx="0" cy="0"/>
+        </a:xfrm>
+      </p:grpSpPr>
+      <p:sp>
+        <p:nvSpPr>
+          <p:cNvPr id="2" name="Заголовок 1"/>
+          <p:cNvSpPr>
+            <a:spLocks noGrp="1"/>
+          </p:cNvSpPr>
+          <p:nvPr>
+            <p:ph type="title"/>
+          </p:nvPr>
+        </p:nvSpPr>
+        <p:spPr/>
+        <p:txBody>
           <a:bodyPr>
             <a:normAutofit fontScale="90000"/>
           </a:bodyPr>
@@ -3325,7 +3734,7 @@
 </p:sld>
 </file>
 
-<file path=ppt/slides/slide11.xml><?xml version="1.0" encoding="utf-8"?>
+<file path=ppt/slides/slide12.xml><?xml version="1.0" encoding="utf-8"?>
 <p:sld xmlns:a="http://schemas.openxmlformats.org/drawingml/2006/main" xmlns:r="http://schemas.openxmlformats.org/officeDocument/2006/relationships" xmlns:p="http://schemas.openxmlformats.org/presentationml/2006/main">
   <p:cSld>
     <p:spTree>
@@ -3416,116 +3825,6 @@
 </p:sld>
 </file>
 
-<file path=ppt/slides/slide12.xml><?xml version="1.0" encoding="utf-8"?>
-<p:sld xmlns:a="http://schemas.openxmlformats.org/drawingml/2006/main" xmlns:r="http://schemas.openxmlformats.org/officeDocument/2006/relationships" xmlns:p="http://schemas.openxmlformats.org/presentationml/2006/main">
-  <p:cSld>
-    <p:spTree>
-      <p:nvGrpSpPr>
-        <p:cNvPr id="1" name=""/>
-        <p:cNvGrpSpPr/>
-        <p:nvPr/>
-      </p:nvGrpSpPr>
-      <p:grpSpPr>
-        <a:xfrm>
-          <a:off x="0" y="0"/>
-          <a:ext cx="0" cy="0"/>
-          <a:chOff x="0" y="0"/>
-          <a:chExt cx="0" cy="0"/>
-        </a:xfrm>
-      </p:grpSpPr>
-      <p:sp>
-        <p:nvSpPr>
-          <p:cNvPr id="2" name="Заголовок 1"/>
-          <p:cNvSpPr>
-            <a:spLocks noGrp="1"/>
-          </p:cNvSpPr>
-          <p:nvPr>
-            <p:ph type="title"/>
-          </p:nvPr>
-        </p:nvSpPr>
-        <p:spPr/>
-        <p:txBody>
-          <a:bodyPr/>
-          <a:lstStyle/>
-          <a:p>
-            <a:r>
-              <a:rPr lang="ru-RU" dirty="0" smtClean="0"/>
-              <a:t>Создание </a:t>
-            </a:r>
-            <a:r>
-              <a:rPr lang="ru-RU" dirty="0" err="1" smtClean="0"/>
-              <a:t>бандла</a:t>
-            </a:r>
-            <a:endParaRPr lang="ru-RU" dirty="0"/>
-          </a:p>
-        </p:txBody>
-      </p:sp>
-      <p:sp>
-        <p:nvSpPr>
-          <p:cNvPr id="3" name="Объект 2"/>
-          <p:cNvSpPr>
-            <a:spLocks noGrp="1"/>
-          </p:cNvSpPr>
-          <p:nvPr>
-            <p:ph idx="1"/>
-          </p:nvPr>
-        </p:nvSpPr>
-        <p:spPr/>
-        <p:txBody>
-          <a:bodyPr>
-            <a:normAutofit/>
-          </a:bodyPr>
-          <a:lstStyle/>
-          <a:p>
-            <a:r>
-              <a:rPr lang="en-US" sz="2000" dirty="0" err="1" smtClean="0"/>
-              <a:t>php</a:t>
-            </a:r>
-            <a:r>
-              <a:rPr lang="en-US" sz="2000" dirty="0" smtClean="0"/>
-              <a:t> app/console </a:t>
-            </a:r>
-            <a:r>
-              <a:rPr lang="en-US" sz="2000" i="1" dirty="0" err="1" smtClean="0"/>
-              <a:t>generate:bundlenamespace</a:t>
-            </a:r>
-            <a:r>
-              <a:rPr lang="en-US" sz="2000" i="1" dirty="0" smtClean="0"/>
-              <a:t>=</a:t>
-            </a:r>
-            <a:r>
-              <a:rPr lang="en-US" sz="2000" i="1" dirty="0" err="1" smtClean="0"/>
-              <a:t>Kuzstu</a:t>
-            </a:r>
-            <a:r>
-              <a:rPr lang="en-US" sz="2000" i="1" dirty="0" smtClean="0"/>
-              <a:t>/</a:t>
-            </a:r>
-            <a:r>
-              <a:rPr lang="en-US" sz="2000" i="1" dirty="0" err="1" smtClean="0"/>
-              <a:t>BlogBundle</a:t>
-            </a:r>
-            <a:r>
-              <a:rPr lang="en-US" sz="2000" dirty="0" smtClean="0"/>
-              <a:t> </a:t>
-            </a:r>
-            <a:endParaRPr lang="ru-RU" sz="2000" dirty="0"/>
-          </a:p>
-        </p:txBody>
-      </p:sp>
-    </p:spTree>
-    <p:extLst>
-      <p:ext uri="{BB962C8B-B14F-4D97-AF65-F5344CB8AC3E}">
-        <p14:creationId xmlns:p14="http://schemas.microsoft.com/office/powerpoint/2010/main" val="3456455157"/>
-      </p:ext>
-    </p:extLst>
-  </p:cSld>
-  <p:clrMapOvr>
-    <a:masterClrMapping/>
-  </p:clrMapOvr>
-</p:sld>
-</file>
-
 <file path=ppt/slides/slide13.xml><?xml version="1.0" encoding="utf-8"?>
 <p:sld xmlns:a="http://schemas.openxmlformats.org/drawingml/2006/main" xmlns:r="http://schemas.openxmlformats.org/officeDocument/2006/relationships" xmlns:p="http://schemas.openxmlformats.org/presentationml/2006/main">
   <p:cSld>
@@ -3559,8 +3858,12 @@
           <a:lstStyle/>
           <a:p>
             <a:r>
-              <a:rPr lang="en-US" dirty="0" smtClean="0"/>
-              <a:t>ORM (Object Relation Mapping)</a:t>
+              <a:rPr lang="ru-RU" dirty="0" smtClean="0"/>
+              <a:t>Создание </a:t>
+            </a:r>
+            <a:r>
+              <a:rPr lang="ru-RU" dirty="0" err="1" smtClean="0"/>
+              <a:t>бандла</a:t>
             </a:r>
             <a:endParaRPr lang="ru-RU" dirty="0"/>
           </a:p>
@@ -3578,27 +3881,51 @@
         </p:nvSpPr>
         <p:spPr/>
         <p:txBody>
-          <a:bodyPr/>
-          <a:lstStyle/>
-          <a:p>
-            <a:r>
-              <a:rPr lang="ru-RU" dirty="0" smtClean="0"/>
-              <a:t>Позволяет проецировать объектную модель в структуру БД</a:t>
-            </a:r>
-          </a:p>
-          <a:p>
-            <a:r>
-              <a:rPr lang="ru-RU" dirty="0" smtClean="0"/>
-              <a:t>Автоматическая генерация структуры БД, а также связей, индексов, внешних ключей</a:t>
-            </a:r>
-            <a:endParaRPr lang="en-US" dirty="0" smtClean="0"/>
+          <a:bodyPr>
+            <a:normAutofit/>
+          </a:bodyPr>
+          <a:lstStyle/>
+          <a:p>
+            <a:r>
+              <a:rPr lang="en-US" sz="2000" dirty="0" err="1" smtClean="0"/>
+              <a:t>php</a:t>
+            </a:r>
+            <a:r>
+              <a:rPr lang="en-US" sz="2000" dirty="0" smtClean="0"/>
+              <a:t> app/console </a:t>
+            </a:r>
+            <a:r>
+              <a:rPr lang="en-US" sz="2000" i="1" dirty="0" err="1" smtClean="0"/>
+              <a:t>generate:bundle</a:t>
+            </a:r>
+            <a:r>
+              <a:rPr lang="en-US" sz="2000" i="1" smtClean="0"/>
+              <a:t> --namespace=</a:t>
+            </a:r>
+            <a:r>
+              <a:rPr lang="en-US" sz="2000" i="1" dirty="0" err="1" smtClean="0"/>
+              <a:t>Kuzstu</a:t>
+            </a:r>
+            <a:r>
+              <a:rPr lang="en-US" sz="2000" i="1" dirty="0" smtClean="0"/>
+              <a:t>/</a:t>
+            </a:r>
+            <a:r>
+              <a:rPr lang="en-US" sz="2000" i="1" dirty="0" err="1" smtClean="0"/>
+              <a:t>BlogBundle</a:t>
+            </a:r>
+            <a:r>
+              <a:rPr lang="en-US" sz="2000" dirty="0" smtClean="0"/>
+              <a:t> </a:t>
+            </a:r>
+            <a:endParaRPr lang="ru-RU" sz="2000" dirty="0"/>
           </a:p>
         </p:txBody>
       </p:sp>
     </p:spTree>
     <p:extLst>
       <p:ext uri="{BB962C8B-B14F-4D97-AF65-F5344CB8AC3E}">
-        <p14:creationId xmlns:p14="http://schemas.microsoft.com/office/powerpoint/2010/main" val="3694456012"/>
+        <p14:creationId xmlns:p14="http://schemas.microsoft.com/office/powerpoint/2010/main" val="3456455157"/>
       </p:ext>
     </p:extLst>
   </p:cSld>
@@ -3640,6 +3967,88 @@
           <a:bodyPr/>
           <a:lstStyle/>
           <a:p>
+            <a:r>
+              <a:rPr lang="en-US" dirty="0" smtClean="0"/>
+              <a:t>ORM (Object Relation Mapping)</a:t>
+            </a:r>
+            <a:endParaRPr lang="ru-RU" dirty="0"/>
+          </a:p>
+        </p:txBody>
+      </p:sp>
+      <p:sp>
+        <p:nvSpPr>
+          <p:cNvPr id="3" name="Объект 2"/>
+          <p:cNvSpPr>
+            <a:spLocks noGrp="1"/>
+          </p:cNvSpPr>
+          <p:nvPr>
+            <p:ph idx="1"/>
+          </p:nvPr>
+        </p:nvSpPr>
+        <p:spPr/>
+        <p:txBody>
+          <a:bodyPr/>
+          <a:lstStyle/>
+          <a:p>
+            <a:r>
+              <a:rPr lang="ru-RU" dirty="0" smtClean="0"/>
+              <a:t>Позволяет проецировать объектную модель в структуру БД</a:t>
+            </a:r>
+          </a:p>
+          <a:p>
+            <a:r>
+              <a:rPr lang="ru-RU" dirty="0" smtClean="0"/>
+              <a:t>Автоматическая генерация структуры БД, а также связей, индексов, внешних ключей</a:t>
+            </a:r>
+            <a:endParaRPr lang="en-US" dirty="0" smtClean="0"/>
+          </a:p>
+        </p:txBody>
+      </p:sp>
+    </p:spTree>
+    <p:extLst>
+      <p:ext uri="{BB962C8B-B14F-4D97-AF65-F5344CB8AC3E}">
+        <p14:creationId xmlns:p14="http://schemas.microsoft.com/office/powerpoint/2010/main" val="3694456012"/>
+      </p:ext>
+    </p:extLst>
+  </p:cSld>
+  <p:clrMapOvr>
+    <a:masterClrMapping/>
+  </p:clrMapOvr>
+</p:sld>
+</file>
+
+<file path=ppt/slides/slide15.xml><?xml version="1.0" encoding="utf-8"?>
+<p:sld xmlns:a="http://schemas.openxmlformats.org/drawingml/2006/main" xmlns:r="http://schemas.openxmlformats.org/officeDocument/2006/relationships" xmlns:p="http://schemas.openxmlformats.org/presentationml/2006/main">
+  <p:cSld>
+    <p:spTree>
+      <p:nvGrpSpPr>
+        <p:cNvPr id="1" name=""/>
+        <p:cNvGrpSpPr/>
+        <p:nvPr/>
+      </p:nvGrpSpPr>
+      <p:grpSpPr>
+        <a:xfrm>
+          <a:off x="0" y="0"/>
+          <a:ext cx="0" cy="0"/>
+          <a:chOff x="0" y="0"/>
+          <a:chExt cx="0" cy="0"/>
+        </a:xfrm>
+      </p:grpSpPr>
+      <p:sp>
+        <p:nvSpPr>
+          <p:cNvPr id="2" name="Заголовок 1"/>
+          <p:cNvSpPr>
+            <a:spLocks noGrp="1"/>
+          </p:cNvSpPr>
+          <p:nvPr>
+            <p:ph type="title"/>
+          </p:nvPr>
+        </p:nvSpPr>
+        <p:spPr/>
+        <p:txBody>
+          <a:bodyPr/>
+          <a:lstStyle/>
+          <a:p>
             <a:endParaRPr lang="ru-RU"/>
           </a:p>
         </p:txBody>
@@ -3693,7 +4102,7 @@
 </p:sld>
 </file>
 
-<file path=ppt/slides/slide15.xml><?xml version="1.0" encoding="utf-8"?>
+<file path=ppt/slides/slide16.xml><?xml version="1.0" encoding="utf-8"?>
 <p:sld xmlns:a="http://schemas.openxmlformats.org/drawingml/2006/main" xmlns:r="http://schemas.openxmlformats.org/officeDocument/2006/relationships" xmlns:p="http://schemas.openxmlformats.org/presentationml/2006/main">
   <p:cSld>
     <p:spTree>
@@ -3784,7 +4193,7 @@
 </p:sld>
 </file>
 
-<file path=ppt/slides/slide16.xml><?xml version="1.0" encoding="utf-8"?>
+<file path=ppt/slides/slide17.xml><?xml version="1.0" encoding="utf-8"?>
 <p:sld xmlns:a="http://schemas.openxmlformats.org/drawingml/2006/main" xmlns:r="http://schemas.openxmlformats.org/officeDocument/2006/relationships" xmlns:p="http://schemas.openxmlformats.org/presentationml/2006/main">
   <p:cSld>
     <p:spTree>
@@ -3868,7 +4277,7 @@
 </p:sld>
 </file>
 
-<file path=ppt/slides/slide17.xml><?xml version="1.0" encoding="utf-8"?>
+<file path=ppt/slides/slide18.xml><?xml version="1.0" encoding="utf-8"?>
 <p:sld xmlns:a="http://schemas.openxmlformats.org/drawingml/2006/main" xmlns:r="http://schemas.openxmlformats.org/officeDocument/2006/relationships" xmlns:p="http://schemas.openxmlformats.org/presentationml/2006/main">
   <p:cSld>
     <p:spTree>
@@ -4073,7 +4482,7 @@
 </p:sld>
 </file>
 
-<file path=ppt/slides/slide18.xml><?xml version="1.0" encoding="utf-8"?>
+<file path=ppt/slides/slide19.xml><?xml version="1.0" encoding="utf-8"?>
 <p:sld xmlns:a="http://schemas.openxmlformats.org/drawingml/2006/main" xmlns:r="http://schemas.openxmlformats.org/officeDocument/2006/relationships" xmlns:p="http://schemas.openxmlformats.org/presentationml/2006/main">
   <p:cSld>
     <p:spTree>
@@ -4236,7 +4645,91 @@
 </p:sld>
 </file>
 
-<file path=ppt/slides/slide19.xml><?xml version="1.0" encoding="utf-8"?>
+<file path=ppt/slides/slide2.xml><?xml version="1.0" encoding="utf-8"?>
+<p:sld xmlns:a="http://schemas.openxmlformats.org/drawingml/2006/main" xmlns:r="http://schemas.openxmlformats.org/officeDocument/2006/relationships" xmlns:p="http://schemas.openxmlformats.org/presentationml/2006/main">
+  <p:cSld>
+    <p:spTree>
+      <p:nvGrpSpPr>
+        <p:cNvPr id="1" name=""/>
+        <p:cNvGrpSpPr/>
+        <p:nvPr/>
+      </p:nvGrpSpPr>
+      <p:grpSpPr>
+        <a:xfrm>
+          <a:off x="0" y="0"/>
+          <a:ext cx="0" cy="0"/>
+          <a:chOff x="0" y="0"/>
+          <a:chExt cx="0" cy="0"/>
+        </a:xfrm>
+      </p:grpSpPr>
+      <p:pic>
+        <p:nvPicPr>
+          <p:cNvPr id="1026" name="Picture 2"/>
+          <p:cNvPicPr>
+            <a:picLocks noChangeAspect="1" noChangeArrowheads="1"/>
+          </p:cNvPicPr>
+          <p:nvPr/>
+        </p:nvPicPr>
+        <p:blipFill>
+          <a:blip r:embed="rId2">
+            <a:extLst>
+              <a:ext uri="{28A0092B-C50C-407E-A947-70E740481C1C}">
+                <a14:useLocalDpi xmlns:a14="http://schemas.microsoft.com/office/drawing/2010/main" val="0"/>
+              </a:ext>
+            </a:extLst>
+          </a:blip>
+          <a:srcRect/>
+          <a:stretch>
+            <a:fillRect/>
+          </a:stretch>
+        </p:blipFill>
+        <p:spPr bwMode="auto">
+          <a:xfrm>
+            <a:off x="1003224" y="116632"/>
+            <a:ext cx="7097168" cy="6587254"/>
+          </a:xfrm>
+          <a:prstGeom prst="rect">
+            <a:avLst/>
+          </a:prstGeom>
+          <a:noFill/>
+          <a:ln>
+            <a:noFill/>
+          </a:ln>
+          <a:extLst>
+            <a:ext uri="{909E8E84-426E-40DD-AFC4-6F175D3DCCD1}">
+              <a14:hiddenFill xmlns:a14="http://schemas.microsoft.com/office/drawing/2010/main">
+                <a:solidFill>
+                  <a:schemeClr val="accent1"/>
+                </a:solidFill>
+              </a14:hiddenFill>
+            </a:ext>
+            <a:ext uri="{91240B29-F687-4F45-9708-019B960494DF}">
+              <a14:hiddenLine xmlns:a14="http://schemas.microsoft.com/office/drawing/2010/main" w="9525">
+                <a:solidFill>
+                  <a:schemeClr val="tx1"/>
+                </a:solidFill>
+                <a:miter lim="800000"/>
+                <a:headEnd/>
+                <a:tailEnd/>
+              </a14:hiddenLine>
+            </a:ext>
+          </a:extLst>
+        </p:spPr>
+      </p:pic>
+    </p:spTree>
+    <p:extLst>
+      <p:ext uri="{BB962C8B-B14F-4D97-AF65-F5344CB8AC3E}">
+        <p14:creationId xmlns:p14="http://schemas.microsoft.com/office/powerpoint/2010/main" val="861920262"/>
+      </p:ext>
+    </p:extLst>
+  </p:cSld>
+  <p:clrMapOvr>
+    <a:masterClrMapping/>
+  </p:clrMapOvr>
+</p:sld>
+</file>
+
+<file path=ppt/slides/slide20.xml><?xml version="1.0" encoding="utf-8"?>
 <p:sld xmlns:a="http://schemas.openxmlformats.org/drawingml/2006/main" xmlns:r="http://schemas.openxmlformats.org/officeDocument/2006/relationships" xmlns:p="http://schemas.openxmlformats.org/presentationml/2006/main">
   <p:cSld>
     <p:spTree>
@@ -4320,97 +4813,7 @@
 </p:sld>
 </file>
 
-<file path=ppt/slides/slide2.xml><?xml version="1.0" encoding="utf-8"?>
-<p:sld xmlns:a="http://schemas.openxmlformats.org/drawingml/2006/main" xmlns:r="http://schemas.openxmlformats.org/officeDocument/2006/relationships" xmlns:p="http://schemas.openxmlformats.org/presentationml/2006/main">
-  <p:cSld>
-    <p:spTree>
-      <p:nvGrpSpPr>
-        <p:cNvPr id="1" name=""/>
-        <p:cNvGrpSpPr/>
-        <p:nvPr/>
-      </p:nvGrpSpPr>
-      <p:grpSpPr>
-        <a:xfrm>
-          <a:off x="0" y="0"/>
-          <a:ext cx="0" cy="0"/>
-          <a:chOff x="0" y="0"/>
-          <a:chExt cx="0" cy="0"/>
-        </a:xfrm>
-      </p:grpSpPr>
-      <p:sp>
-        <p:nvSpPr>
-          <p:cNvPr id="2" name="Заголовок 1"/>
-          <p:cNvSpPr>
-            <a:spLocks noGrp="1"/>
-          </p:cNvSpPr>
-          <p:nvPr>
-            <p:ph type="title"/>
-          </p:nvPr>
-        </p:nvSpPr>
-        <p:spPr/>
-        <p:txBody>
-          <a:bodyPr/>
-          <a:lstStyle/>
-          <a:p>
-            <a:r>
-              <a:rPr lang="ru-RU" dirty="0" smtClean="0"/>
-              <a:t>Контроллер</a:t>
-            </a:r>
-            <a:endParaRPr lang="ru-RU" dirty="0"/>
-          </a:p>
-        </p:txBody>
-      </p:sp>
-      <p:pic>
-        <p:nvPicPr>
-          <p:cNvPr id="4" name="Рисунок 3"/>
-          <p:cNvPicPr>
-            <a:picLocks noChangeAspect="1"/>
-          </p:cNvPicPr>
-          <p:nvPr/>
-        </p:nvPicPr>
-        <p:blipFill>
-          <a:blip r:embed="rId2">
-            <a:extLst>
-              <a:ext uri="{28A0092B-C50C-407E-A947-70E740481C1C}">
-                <a14:useLocalDpi xmlns:a14="http://schemas.microsoft.com/office/drawing/2010/main" val="0"/>
-              </a:ext>
-            </a:extLst>
-          </a:blip>
-          <a:stretch>
-            <a:fillRect/>
-          </a:stretch>
-        </p:blipFill>
-        <p:spPr>
-          <a:xfrm>
-            <a:off x="1766496" y="385337"/>
-            <a:ext cx="5611008" cy="6087325"/>
-          </a:xfrm>
-          <a:prstGeom prst="rect">
-            <a:avLst/>
-          </a:prstGeom>
-        </p:spPr>
-      </p:pic>
-    </p:spTree>
-    <p:extLst>
-      <p:ext uri="{BB962C8B-B14F-4D97-AF65-F5344CB8AC3E}">
-        <p14:creationId xmlns:p14="http://schemas.microsoft.com/office/powerpoint/2010/main" val="2185713585"/>
-      </p:ext>
-    </p:extLst>
-  </p:cSld>
-  <p:clrMapOvr>
-    <a:masterClrMapping/>
-  </p:clrMapOvr>
-  <p:timing>
-    <p:tnLst>
-      <p:par>
-        <p:cTn id="1" dur="indefinite" restart="never" nodeType="tmRoot"/>
-      </p:par>
-    </p:tnLst>
-  </p:timing>
-</p:sld>
-</file>
-
-<file path=ppt/slides/slide20.xml><?xml version="1.0" encoding="utf-8"?>
+<file path=ppt/slides/slide21.xml><?xml version="1.0" encoding="utf-8"?>
 <p:sld xmlns:a="http://schemas.openxmlformats.org/drawingml/2006/main" xmlns:r="http://schemas.openxmlformats.org/officeDocument/2006/relationships" xmlns:p="http://schemas.openxmlformats.org/presentationml/2006/main">
   <p:cSld>
     <p:spTree>
@@ -4500,7 +4903,7 @@
 </p:sld>
 </file>
 
-<file path=ppt/slides/slide21.xml><?xml version="1.0" encoding="utf-8"?>
+<file path=ppt/slides/slide22.xml><?xml version="1.0" encoding="utf-8"?>
 <p:sld xmlns:a="http://schemas.openxmlformats.org/drawingml/2006/main" xmlns:r="http://schemas.openxmlformats.org/officeDocument/2006/relationships" xmlns:p="http://schemas.openxmlformats.org/presentationml/2006/main">
   <p:cSld>
     <p:spTree>
@@ -4584,7 +4987,7 @@
 </p:sld>
 </file>
 
-<file path=ppt/slides/slide22.xml><?xml version="1.0" encoding="utf-8"?>
+<file path=ppt/slides/slide23.xml><?xml version="1.0" encoding="utf-8"?>
 <p:sld xmlns:a="http://schemas.openxmlformats.org/drawingml/2006/main" xmlns:r="http://schemas.openxmlformats.org/officeDocument/2006/relationships" xmlns:p="http://schemas.openxmlformats.org/presentationml/2006/main">
   <p:cSld>
     <p:spTree>
@@ -4773,7 +5176,516 @@
 </p:sld>
 </file>
 
+<file path=ppt/slides/slide24.xml><?xml version="1.0" encoding="utf-8"?>
+<p:sld xmlns:a="http://schemas.openxmlformats.org/drawingml/2006/main" xmlns:r="http://schemas.openxmlformats.org/officeDocument/2006/relationships" xmlns:p="http://schemas.openxmlformats.org/presentationml/2006/main">
+  <p:cSld>
+    <p:spTree>
+      <p:nvGrpSpPr>
+        <p:cNvPr id="1" name=""/>
+        <p:cNvGrpSpPr/>
+        <p:nvPr/>
+      </p:nvGrpSpPr>
+      <p:grpSpPr>
+        <a:xfrm>
+          <a:off x="0" y="0"/>
+          <a:ext cx="0" cy="0"/>
+          <a:chOff x="0" y="0"/>
+          <a:chExt cx="0" cy="0"/>
+        </a:xfrm>
+      </p:grpSpPr>
+      <p:sp>
+        <p:nvSpPr>
+          <p:cNvPr id="2" name="Заголовок 1"/>
+          <p:cNvSpPr>
+            <a:spLocks noGrp="1"/>
+          </p:cNvSpPr>
+          <p:nvPr>
+            <p:ph type="title"/>
+          </p:nvPr>
+        </p:nvSpPr>
+        <p:spPr/>
+        <p:txBody>
+          <a:bodyPr/>
+          <a:lstStyle/>
+          <a:p>
+            <a:r>
+              <a:rPr lang="ru-RU" dirty="0" smtClean="0"/>
+              <a:t>Шаблон </a:t>
+            </a:r>
+            <a:r>
+              <a:rPr lang="en-US" dirty="0" smtClean="0"/>
+              <a:t>Builder(</a:t>
+            </a:r>
+            <a:r>
+              <a:rPr lang="ru-RU" dirty="0" smtClean="0"/>
+              <a:t>Строитель</a:t>
+            </a:r>
+            <a:r>
+              <a:rPr lang="en-US" dirty="0" smtClean="0"/>
+              <a:t>)</a:t>
+            </a:r>
+            <a:endParaRPr lang="ru-RU" dirty="0"/>
+          </a:p>
+        </p:txBody>
+      </p:sp>
+      <p:pic>
+        <p:nvPicPr>
+          <p:cNvPr id="3074" name="Picture 2" descr="http://habr.habrastorage.org/post_images/16b/2fe/a7f/16b2fea7f7f4dcd14fe2ad0b0bb9bf84.jpg"/>
+          <p:cNvPicPr>
+            <a:picLocks noChangeAspect="1" noChangeArrowheads="1"/>
+          </p:cNvPicPr>
+          <p:nvPr/>
+        </p:nvPicPr>
+        <p:blipFill>
+          <a:blip r:embed="rId2">
+            <a:extLst>
+              <a:ext uri="{28A0092B-C50C-407E-A947-70E740481C1C}">
+                <a14:useLocalDpi xmlns:a14="http://schemas.microsoft.com/office/drawing/2010/main" val="0"/>
+              </a:ext>
+            </a:extLst>
+          </a:blip>
+          <a:srcRect/>
+          <a:stretch>
+            <a:fillRect/>
+          </a:stretch>
+        </p:blipFill>
+        <p:spPr bwMode="auto">
+          <a:xfrm>
+            <a:off x="486285" y="1556792"/>
+            <a:ext cx="8460432" cy="3534683"/>
+          </a:xfrm>
+          <a:prstGeom prst="rect">
+            <a:avLst/>
+          </a:prstGeom>
+          <a:noFill/>
+          <a:extLst>
+            <a:ext uri="{909E8E84-426E-40DD-AFC4-6F175D3DCCD1}">
+              <a14:hiddenFill xmlns:a14="http://schemas.microsoft.com/office/drawing/2010/main">
+                <a:solidFill>
+                  <a:srgbClr val="FFFFFF"/>
+                </a:solidFill>
+              </a14:hiddenFill>
+            </a:ext>
+          </a:extLst>
+        </p:spPr>
+      </p:pic>
+    </p:spTree>
+    <p:extLst>
+      <p:ext uri="{BB962C8B-B14F-4D97-AF65-F5344CB8AC3E}">
+        <p14:creationId xmlns:p14="http://schemas.microsoft.com/office/powerpoint/2010/main" val="3791320515"/>
+      </p:ext>
+    </p:extLst>
+  </p:cSld>
+  <p:clrMapOvr>
+    <a:masterClrMapping/>
+  </p:clrMapOvr>
+</p:sld>
+</file>
+
+<file path=ppt/slides/slide25.xml><?xml version="1.0" encoding="utf-8"?>
+<p:sld xmlns:a="http://schemas.openxmlformats.org/drawingml/2006/main" xmlns:r="http://schemas.openxmlformats.org/officeDocument/2006/relationships" xmlns:p="http://schemas.openxmlformats.org/presentationml/2006/main">
+  <p:cSld>
+    <p:spTree>
+      <p:nvGrpSpPr>
+        <p:cNvPr id="1" name=""/>
+        <p:cNvGrpSpPr/>
+        <p:nvPr/>
+      </p:nvGrpSpPr>
+      <p:grpSpPr>
+        <a:xfrm>
+          <a:off x="0" y="0"/>
+          <a:ext cx="0" cy="0"/>
+          <a:chOff x="0" y="0"/>
+          <a:chExt cx="0" cy="0"/>
+        </a:xfrm>
+      </p:grpSpPr>
+      <p:sp>
+        <p:nvSpPr>
+          <p:cNvPr id="2" name="Заголовок 1"/>
+          <p:cNvSpPr>
+            <a:spLocks noGrp="1"/>
+          </p:cNvSpPr>
+          <p:nvPr>
+            <p:ph type="title"/>
+          </p:nvPr>
+        </p:nvSpPr>
+        <p:spPr/>
+        <p:txBody>
+          <a:bodyPr/>
+          <a:lstStyle/>
+          <a:p>
+            <a:r>
+              <a:rPr lang="ru-RU" dirty="0" smtClean="0"/>
+              <a:t>Сервисы</a:t>
+            </a:r>
+            <a:endParaRPr lang="ru-RU" dirty="0"/>
+          </a:p>
+        </p:txBody>
+      </p:sp>
+      <p:pic>
+        <p:nvPicPr>
+          <p:cNvPr id="2051" name="Picture 3"/>
+          <p:cNvPicPr>
+            <a:picLocks noChangeAspect="1" noChangeArrowheads="1"/>
+          </p:cNvPicPr>
+          <p:nvPr/>
+        </p:nvPicPr>
+        <p:blipFill>
+          <a:blip r:embed="rId2">
+            <a:extLst>
+              <a:ext uri="{28A0092B-C50C-407E-A947-70E740481C1C}">
+                <a14:useLocalDpi xmlns:a14="http://schemas.microsoft.com/office/drawing/2010/main" val="0"/>
+              </a:ext>
+            </a:extLst>
+          </a:blip>
+          <a:srcRect/>
+          <a:stretch>
+            <a:fillRect/>
+          </a:stretch>
+        </p:blipFill>
+        <p:spPr bwMode="auto">
+          <a:xfrm>
+            <a:off x="323527" y="1399065"/>
+            <a:ext cx="8812801" cy="1706182"/>
+          </a:xfrm>
+          <a:prstGeom prst="rect">
+            <a:avLst/>
+          </a:prstGeom>
+          <a:noFill/>
+          <a:ln>
+            <a:noFill/>
+          </a:ln>
+          <a:extLst>
+            <a:ext uri="{909E8E84-426E-40DD-AFC4-6F175D3DCCD1}">
+              <a14:hiddenFill xmlns:a14="http://schemas.microsoft.com/office/drawing/2010/main">
+                <a:solidFill>
+                  <a:schemeClr val="accent1"/>
+                </a:solidFill>
+              </a14:hiddenFill>
+            </a:ext>
+            <a:ext uri="{91240B29-F687-4F45-9708-019B960494DF}">
+              <a14:hiddenLine xmlns:a14="http://schemas.microsoft.com/office/drawing/2010/main" w="9525">
+                <a:solidFill>
+                  <a:schemeClr val="tx1"/>
+                </a:solidFill>
+                <a:miter lim="800000"/>
+                <a:headEnd/>
+                <a:tailEnd/>
+              </a14:hiddenLine>
+            </a:ext>
+          </a:extLst>
+        </p:spPr>
+      </p:pic>
+    </p:spTree>
+    <p:extLst>
+      <p:ext uri="{BB962C8B-B14F-4D97-AF65-F5344CB8AC3E}">
+        <p14:creationId xmlns:p14="http://schemas.microsoft.com/office/powerpoint/2010/main" val="2777427864"/>
+      </p:ext>
+    </p:extLst>
+  </p:cSld>
+  <p:clrMapOvr>
+    <a:masterClrMapping/>
+  </p:clrMapOvr>
+</p:sld>
+</file>
+
+<file path=ppt/slides/slide26.xml><?xml version="1.0" encoding="utf-8"?>
+<p:sld xmlns:a="http://schemas.openxmlformats.org/drawingml/2006/main" xmlns:r="http://schemas.openxmlformats.org/officeDocument/2006/relationships" xmlns:p="http://schemas.openxmlformats.org/presentationml/2006/main">
+  <p:cSld>
+    <p:spTree>
+      <p:nvGrpSpPr>
+        <p:cNvPr id="1" name=""/>
+        <p:cNvGrpSpPr/>
+        <p:nvPr/>
+      </p:nvGrpSpPr>
+      <p:grpSpPr>
+        <a:xfrm>
+          <a:off x="0" y="0"/>
+          <a:ext cx="0" cy="0"/>
+          <a:chOff x="0" y="0"/>
+          <a:chExt cx="0" cy="0"/>
+        </a:xfrm>
+      </p:grpSpPr>
+      <p:sp>
+        <p:nvSpPr>
+          <p:cNvPr id="2" name="Заголовок 1"/>
+          <p:cNvSpPr>
+            <a:spLocks noGrp="1"/>
+          </p:cNvSpPr>
+          <p:nvPr>
+            <p:ph type="title"/>
+          </p:nvPr>
+        </p:nvSpPr>
+        <p:spPr/>
+        <p:txBody>
+          <a:bodyPr/>
+          <a:lstStyle/>
+          <a:p>
+            <a:r>
+              <a:rPr lang="en-US" dirty="0" smtClean="0"/>
+              <a:t>Inversion of Control</a:t>
+            </a:r>
+            <a:endParaRPr lang="ru-RU" dirty="0"/>
+          </a:p>
+        </p:txBody>
+      </p:sp>
+      <p:sp>
+        <p:nvSpPr>
+          <p:cNvPr id="3" name="Объект 2"/>
+          <p:cNvSpPr>
+            <a:spLocks noGrp="1"/>
+          </p:cNvSpPr>
+          <p:nvPr>
+            <p:ph idx="1"/>
+          </p:nvPr>
+        </p:nvSpPr>
+        <p:spPr/>
+        <p:txBody>
+          <a:bodyPr>
+            <a:normAutofit lnSpcReduction="10000"/>
+          </a:bodyPr>
+          <a:lstStyle/>
+          <a:p>
+            <a:r>
+              <a:rPr lang="ru-RU" dirty="0"/>
+              <a:t> </a:t>
+            </a:r>
+            <a:r>
+              <a:rPr lang="ru-RU" dirty="0" smtClean="0"/>
+              <a:t>Принцип, согласно которому каждый </a:t>
+            </a:r>
+            <a:r>
+              <a:rPr lang="ru-RU" dirty="0"/>
+              <a:t>компонент системы должен быть как можно более изолированным от других, не полагаясь в своей работе на детали конкретной реализации других </a:t>
+            </a:r>
+            <a:r>
+              <a:rPr lang="ru-RU" dirty="0" smtClean="0"/>
+              <a:t>компонентов</a:t>
+            </a:r>
+            <a:endParaRPr lang="en-US" dirty="0" smtClean="0"/>
+          </a:p>
+          <a:p>
+            <a:r>
+              <a:rPr lang="ru-RU" dirty="0" smtClean="0"/>
+              <a:t>В </a:t>
+            </a:r>
+            <a:r>
+              <a:rPr lang="en-US" dirty="0" err="1" smtClean="0"/>
+              <a:t>Symfony</a:t>
+            </a:r>
+            <a:r>
+              <a:rPr lang="en-US" dirty="0" smtClean="0"/>
+              <a:t> </a:t>
+            </a:r>
+            <a:r>
+              <a:rPr lang="ru-RU" dirty="0" smtClean="0"/>
+              <a:t>применятся две реализации</a:t>
+            </a:r>
+            <a:r>
+              <a:rPr lang="en-US" dirty="0" smtClean="0"/>
+              <a:t>:</a:t>
+            </a:r>
+          </a:p>
+          <a:p>
+            <a:r>
+              <a:rPr lang="en-US" dirty="0"/>
+              <a:t>Service </a:t>
+            </a:r>
+            <a:r>
+              <a:rPr lang="en-US" dirty="0" smtClean="0"/>
+              <a:t>locator</a:t>
+            </a:r>
+          </a:p>
+          <a:p>
+            <a:r>
+              <a:rPr lang="en-US" dirty="0" smtClean="0"/>
+              <a:t>Dependency Injection</a:t>
+            </a:r>
+          </a:p>
+          <a:p>
+            <a:pPr marL="0" indent="0">
+              <a:buNone/>
+            </a:pPr>
+            <a:endParaRPr lang="ru-RU" dirty="0"/>
+          </a:p>
+        </p:txBody>
+      </p:sp>
+    </p:spTree>
+    <p:extLst>
+      <p:ext uri="{BB962C8B-B14F-4D97-AF65-F5344CB8AC3E}">
+        <p14:creationId xmlns:p14="http://schemas.microsoft.com/office/powerpoint/2010/main" val="2485722772"/>
+      </p:ext>
+    </p:extLst>
+  </p:cSld>
+  <p:clrMapOvr>
+    <a:masterClrMapping/>
+  </p:clrMapOvr>
+</p:sld>
+</file>
+
+<file path=ppt/slides/slide27.xml><?xml version="1.0" encoding="utf-8"?>
+<p:sld xmlns:a="http://schemas.openxmlformats.org/drawingml/2006/main" xmlns:r="http://schemas.openxmlformats.org/officeDocument/2006/relationships" xmlns:p="http://schemas.openxmlformats.org/presentationml/2006/main">
+  <p:cSld>
+    <p:spTree>
+      <p:nvGrpSpPr>
+        <p:cNvPr id="1" name=""/>
+        <p:cNvGrpSpPr/>
+        <p:nvPr/>
+      </p:nvGrpSpPr>
+      <p:grpSpPr>
+        <a:xfrm>
+          <a:off x="0" y="0"/>
+          <a:ext cx="0" cy="0"/>
+          <a:chOff x="0" y="0"/>
+          <a:chExt cx="0" cy="0"/>
+        </a:xfrm>
+      </p:grpSpPr>
+      <p:sp>
+        <p:nvSpPr>
+          <p:cNvPr id="2" name="Заголовок 1"/>
+          <p:cNvSpPr>
+            <a:spLocks noGrp="1"/>
+          </p:cNvSpPr>
+          <p:nvPr>
+            <p:ph type="title"/>
+          </p:nvPr>
+        </p:nvSpPr>
+        <p:spPr/>
+        <p:txBody>
+          <a:bodyPr/>
+          <a:lstStyle/>
+          <a:p>
+            <a:r>
+              <a:rPr lang="ru-RU" dirty="0" smtClean="0"/>
+              <a:t>Литература</a:t>
+            </a:r>
+            <a:endParaRPr lang="ru-RU" dirty="0"/>
+          </a:p>
+        </p:txBody>
+      </p:sp>
+      <p:sp>
+        <p:nvSpPr>
+          <p:cNvPr id="3" name="Объект 2"/>
+          <p:cNvSpPr>
+            <a:spLocks noGrp="1"/>
+          </p:cNvSpPr>
+          <p:nvPr>
+            <p:ph idx="1"/>
+          </p:nvPr>
+        </p:nvSpPr>
+        <p:spPr/>
+        <p:txBody>
+          <a:bodyPr/>
+          <a:lstStyle/>
+          <a:p>
+            <a:endParaRPr lang="ru-RU" dirty="0"/>
+          </a:p>
+        </p:txBody>
+      </p:sp>
+    </p:spTree>
+    <p:extLst>
+      <p:ext uri="{BB962C8B-B14F-4D97-AF65-F5344CB8AC3E}">
+        <p14:creationId xmlns:p14="http://schemas.microsoft.com/office/powerpoint/2010/main" val="791036936"/>
+      </p:ext>
+    </p:extLst>
+  </p:cSld>
+  <p:clrMapOvr>
+    <a:masterClrMapping/>
+  </p:clrMapOvr>
+</p:sld>
+</file>
+
 <file path=ppt/slides/slide3.xml><?xml version="1.0" encoding="utf-8"?>
+<p:sld xmlns:a="http://schemas.openxmlformats.org/drawingml/2006/main" xmlns:r="http://schemas.openxmlformats.org/officeDocument/2006/relationships" xmlns:p="http://schemas.openxmlformats.org/presentationml/2006/main">
+  <p:cSld>
+    <p:spTree>
+      <p:nvGrpSpPr>
+        <p:cNvPr id="1" name=""/>
+        <p:cNvGrpSpPr/>
+        <p:nvPr/>
+      </p:nvGrpSpPr>
+      <p:grpSpPr>
+        <a:xfrm>
+          <a:off x="0" y="0"/>
+          <a:ext cx="0" cy="0"/>
+          <a:chOff x="0" y="0"/>
+          <a:chExt cx="0" cy="0"/>
+        </a:xfrm>
+      </p:grpSpPr>
+      <p:sp>
+        <p:nvSpPr>
+          <p:cNvPr id="2" name="Заголовок 1"/>
+          <p:cNvSpPr>
+            <a:spLocks noGrp="1"/>
+          </p:cNvSpPr>
+          <p:nvPr>
+            <p:ph type="title"/>
+          </p:nvPr>
+        </p:nvSpPr>
+        <p:spPr/>
+        <p:txBody>
+          <a:bodyPr/>
+          <a:lstStyle/>
+          <a:p>
+            <a:r>
+              <a:rPr lang="ru-RU" dirty="0" smtClean="0"/>
+              <a:t>Контроллер</a:t>
+            </a:r>
+            <a:endParaRPr lang="ru-RU" dirty="0"/>
+          </a:p>
+        </p:txBody>
+      </p:sp>
+      <p:pic>
+        <p:nvPicPr>
+          <p:cNvPr id="4" name="Рисунок 3"/>
+          <p:cNvPicPr>
+            <a:picLocks noChangeAspect="1"/>
+          </p:cNvPicPr>
+          <p:nvPr/>
+        </p:nvPicPr>
+        <p:blipFill>
+          <a:blip r:embed="rId2">
+            <a:extLst>
+              <a:ext uri="{28A0092B-C50C-407E-A947-70E740481C1C}">
+                <a14:useLocalDpi xmlns:a14="http://schemas.microsoft.com/office/drawing/2010/main" val="0"/>
+              </a:ext>
+            </a:extLst>
+          </a:blip>
+          <a:stretch>
+            <a:fillRect/>
+          </a:stretch>
+        </p:blipFill>
+        <p:spPr>
+          <a:xfrm>
+            <a:off x="1766496" y="385337"/>
+            <a:ext cx="5611008" cy="6087325"/>
+          </a:xfrm>
+          <a:prstGeom prst="rect">
+            <a:avLst/>
+          </a:prstGeom>
+        </p:spPr>
+      </p:pic>
+    </p:spTree>
+    <p:extLst>
+      <p:ext uri="{BB962C8B-B14F-4D97-AF65-F5344CB8AC3E}">
+        <p14:creationId xmlns:p14="http://schemas.microsoft.com/office/powerpoint/2010/main" val="2185713585"/>
+      </p:ext>
+    </p:extLst>
+  </p:cSld>
+  <p:clrMapOvr>
+    <a:masterClrMapping/>
+  </p:clrMapOvr>
+  <p:timing>
+    <p:tnLst>
+      <p:par>
+        <p:cTn id="1" dur="indefinite" restart="never" nodeType="tmRoot"/>
+      </p:par>
+    </p:tnLst>
+  </p:timing>
+</p:sld>
+</file>
+
+<file path=ppt/slides/slide4.xml><?xml version="1.0" encoding="utf-8"?>
 <p:sld xmlns:a="http://schemas.openxmlformats.org/drawingml/2006/main" xmlns:r="http://schemas.openxmlformats.org/officeDocument/2006/relationships" xmlns:p="http://schemas.openxmlformats.org/presentationml/2006/main">
   <p:cSld>
     <p:spTree>
@@ -4887,7 +5799,7 @@
 </p:sld>
 </file>
 
-<file path=ppt/slides/slide4.xml><?xml version="1.0" encoding="utf-8"?>
+<file path=ppt/slides/slide5.xml><?xml version="1.0" encoding="utf-8"?>
 <p:sld xmlns:a="http://schemas.openxmlformats.org/drawingml/2006/main" xmlns:r="http://schemas.openxmlformats.org/officeDocument/2006/relationships" xmlns:p="http://schemas.openxmlformats.org/presentationml/2006/main">
   <p:cSld>
     <p:spTree>
@@ -4977,7 +5889,7 @@
 </p:sld>
 </file>
 
-<file path=ppt/slides/slide5.xml><?xml version="1.0" encoding="utf-8"?>
+<file path=ppt/slides/slide6.xml><?xml version="1.0" encoding="utf-8"?>
 <p:sld xmlns:a="http://schemas.openxmlformats.org/drawingml/2006/main" xmlns:r="http://schemas.openxmlformats.org/officeDocument/2006/relationships" xmlns:p="http://schemas.openxmlformats.org/presentationml/2006/main">
   <p:cSld>
     <p:spTree>
@@ -5093,7 +6005,7 @@
 </p:sld>
 </file>
 
-<file path=ppt/slides/slide6.xml><?xml version="1.0" encoding="utf-8"?>
+<file path=ppt/slides/slide7.xml><?xml version="1.0" encoding="utf-8"?>
 <p:sld xmlns:a="http://schemas.openxmlformats.org/drawingml/2006/main" xmlns:r="http://schemas.openxmlformats.org/officeDocument/2006/relationships" xmlns:p="http://schemas.openxmlformats.org/presentationml/2006/main">
   <p:cSld>
     <p:spTree>
@@ -5177,7 +6089,7 @@
 </p:sld>
 </file>
 
-<file path=ppt/slides/slide7.xml><?xml version="1.0" encoding="utf-8"?>
+<file path=ppt/slides/slide8.xml><?xml version="1.0" encoding="utf-8"?>
 <p:sld xmlns:a="http://schemas.openxmlformats.org/drawingml/2006/main" xmlns:r="http://schemas.openxmlformats.org/officeDocument/2006/relationships" xmlns:p="http://schemas.openxmlformats.org/presentationml/2006/main">
   <p:cSld>
     <p:spTree>
@@ -5244,11 +6156,7 @@
           <a:p>
             <a:r>
               <a:rPr lang="ru-RU" dirty="0" smtClean="0"/>
-              <a:t>Правила оформления </a:t>
-            </a:r>
-            <a:r>
-              <a:rPr lang="ru-RU" dirty="0" smtClean="0"/>
-              <a:t>кода</a:t>
+              <a:t>Правила оформления кода</a:t>
             </a:r>
             <a:endParaRPr lang="en-US" dirty="0" smtClean="0"/>
           </a:p>
@@ -5292,7 +6200,7 @@
 </p:sld>
 </file>
 
-<file path=ppt/slides/slide8.xml><?xml version="1.0" encoding="utf-8"?>
+<file path=ppt/slides/slide9.xml><?xml version="1.0" encoding="utf-8"?>
 <p:sld xmlns:a="http://schemas.openxmlformats.org/drawingml/2006/main" xmlns:r="http://schemas.openxmlformats.org/officeDocument/2006/relationships" xmlns:p="http://schemas.openxmlformats.org/presentationml/2006/main">
   <p:cSld>
     <p:spTree>
@@ -5382,403 +6290,6 @@
     <p:extLst>
       <p:ext uri="{BB962C8B-B14F-4D97-AF65-F5344CB8AC3E}">
         <p14:creationId xmlns:p14="http://schemas.microsoft.com/office/powerpoint/2010/main" val="1822532172"/>
-      </p:ext>
-    </p:extLst>
-  </p:cSld>
-  <p:clrMapOvr>
-    <a:masterClrMapping/>
-  </p:clrMapOvr>
-  <p:timing>
-    <p:tnLst>
-      <p:par>
-        <p:cTn id="1" dur="indefinite" restart="never" nodeType="tmRoot"/>
-      </p:par>
-    </p:tnLst>
-  </p:timing>
-</p:sld>
-</file>
-
-<file path=ppt/slides/slide9.xml><?xml version="1.0" encoding="utf-8"?>
-<p:sld xmlns:a="http://schemas.openxmlformats.org/drawingml/2006/main" xmlns:r="http://schemas.openxmlformats.org/officeDocument/2006/relationships" xmlns:p="http://schemas.openxmlformats.org/presentationml/2006/main">
-  <p:cSld>
-    <p:spTree>
-      <p:nvGrpSpPr>
-        <p:cNvPr id="1" name=""/>
-        <p:cNvGrpSpPr/>
-        <p:nvPr/>
-      </p:nvGrpSpPr>
-      <p:grpSpPr>
-        <a:xfrm>
-          <a:off x="0" y="0"/>
-          <a:ext cx="0" cy="0"/>
-          <a:chOff x="0" y="0"/>
-          <a:chExt cx="0" cy="0"/>
-        </a:xfrm>
-      </p:grpSpPr>
-      <p:sp>
-        <p:nvSpPr>
-          <p:cNvPr id="2" name="Заголовок 1"/>
-          <p:cNvSpPr>
-            <a:spLocks noGrp="1"/>
-          </p:cNvSpPr>
-          <p:nvPr>
-            <p:ph type="title"/>
-          </p:nvPr>
-        </p:nvSpPr>
-        <p:spPr/>
-        <p:txBody>
-          <a:bodyPr/>
-          <a:lstStyle/>
-          <a:p>
-            <a:r>
-              <a:rPr lang="ru-RU" dirty="0" smtClean="0"/>
-              <a:t>Пример автозагрузки классов</a:t>
-            </a:r>
-            <a:endParaRPr lang="ru-RU" dirty="0"/>
-          </a:p>
-        </p:txBody>
-      </p:sp>
-      <p:sp>
-        <p:nvSpPr>
-          <p:cNvPr id="3" name="Объект 2"/>
-          <p:cNvSpPr>
-            <a:spLocks noGrp="1"/>
-          </p:cNvSpPr>
-          <p:nvPr>
-            <p:ph idx="1"/>
-          </p:nvPr>
-        </p:nvSpPr>
-        <p:spPr/>
-        <p:txBody>
-          <a:bodyPr>
-            <a:normAutofit/>
-          </a:bodyPr>
-          <a:lstStyle/>
-          <a:p>
-            <a:pPr marL="0" indent="0">
-              <a:buNone/>
-            </a:pPr>
-            <a:r>
-              <a:rPr lang="en-US" sz="2800" dirty="0" err="1" smtClean="0"/>
-              <a:t>src</a:t>
-            </a:r>
-            <a:r>
-              <a:rPr lang="en-US" sz="2800" dirty="0" smtClean="0"/>
-              <a:t>\</a:t>
-            </a:r>
-            <a:r>
-              <a:rPr lang="en-US" sz="2800" dirty="0" err="1" smtClean="0"/>
-              <a:t>Kuzstu</a:t>
-            </a:r>
-            <a:r>
-              <a:rPr lang="en-US" sz="2800" dirty="0" smtClean="0"/>
-              <a:t>\</a:t>
-            </a:r>
-            <a:r>
-              <a:rPr lang="en-US" sz="2800" dirty="0" err="1" smtClean="0"/>
-              <a:t>BlogBundle</a:t>
-            </a:r>
-            <a:r>
-              <a:rPr lang="en-US" sz="2800" dirty="0" smtClean="0"/>
-              <a:t>\Model</a:t>
-            </a:r>
-            <a:r>
-              <a:rPr lang="ru-RU" sz="2800" dirty="0" smtClean="0"/>
-              <a:t>\</a:t>
-            </a:r>
-            <a:r>
-              <a:rPr lang="en-US" sz="2800" dirty="0" err="1" smtClean="0"/>
-              <a:t>BaseModel.php</a:t>
-            </a:r>
-            <a:endParaRPr lang="en-US" sz="2800" dirty="0" smtClean="0"/>
-          </a:p>
-          <a:p>
-            <a:pPr marL="0" indent="0">
-              <a:buNone/>
-            </a:pPr>
-            <a:endParaRPr lang="en-US" sz="2800" dirty="0">
-              <a:solidFill>
-                <a:schemeClr val="accent1"/>
-              </a:solidFill>
-            </a:endParaRPr>
-          </a:p>
-          <a:p>
-            <a:pPr marL="0" indent="0">
-              <a:buNone/>
-            </a:pPr>
-            <a:r>
-              <a:rPr lang="en-US" sz="2800" dirty="0" err="1" smtClean="0">
-                <a:solidFill>
-                  <a:schemeClr val="accent1"/>
-                </a:solidFill>
-              </a:rPr>
-              <a:t>Kuzstu</a:t>
-            </a:r>
-            <a:r>
-              <a:rPr lang="en-US" sz="2800" dirty="0" smtClean="0">
-                <a:solidFill>
-                  <a:schemeClr val="accent1"/>
-                </a:solidFill>
-              </a:rPr>
-              <a:t>\</a:t>
-            </a:r>
-            <a:r>
-              <a:rPr lang="en-US" sz="2800" dirty="0" err="1" smtClean="0">
-                <a:solidFill>
-                  <a:schemeClr val="accent1"/>
-                </a:solidFill>
-              </a:rPr>
-              <a:t>BlogBundle</a:t>
-            </a:r>
-            <a:r>
-              <a:rPr lang="en-US" sz="2800" dirty="0" smtClean="0">
-                <a:solidFill>
-                  <a:schemeClr val="accent1"/>
-                </a:solidFill>
-              </a:rPr>
-              <a:t>\Model\</a:t>
-            </a:r>
-            <a:r>
-              <a:rPr lang="en-US" sz="2800" dirty="0" err="1" smtClean="0">
-                <a:solidFill>
-                  <a:schemeClr val="accent6">
-                    <a:lumMod val="75000"/>
-                  </a:schemeClr>
-                </a:solidFill>
-              </a:rPr>
-              <a:t>BaseModel.</a:t>
-            </a:r>
-            <a:r>
-              <a:rPr lang="en-US" sz="2800" dirty="0" err="1" smtClean="0"/>
-              <a:t>php</a:t>
-            </a:r>
-            <a:endParaRPr lang="ru-RU" sz="2800" dirty="0" smtClean="0"/>
-          </a:p>
-          <a:p>
-            <a:pPr marL="400050" lvl="1" indent="0">
-              <a:buNone/>
-            </a:pPr>
-            <a:r>
-              <a:rPr lang="en-US" sz="2400" dirty="0">
-                <a:solidFill>
-                  <a:schemeClr val="accent1"/>
-                </a:solidFill>
-              </a:rPr>
-              <a:t>namespace </a:t>
-            </a:r>
-            <a:r>
-              <a:rPr lang="en-US" sz="2400" dirty="0" err="1" smtClean="0"/>
-              <a:t>Kuzstu</a:t>
-            </a:r>
-            <a:r>
-              <a:rPr lang="en-US" sz="2400" dirty="0" smtClean="0"/>
-              <a:t>\</a:t>
-            </a:r>
-            <a:r>
-              <a:rPr lang="en-US" sz="2400" dirty="0" err="1" smtClean="0"/>
-              <a:t>BlogBundle</a:t>
-            </a:r>
-            <a:r>
-              <a:rPr lang="en-US" sz="2400" dirty="0" smtClean="0"/>
-              <a:t>\Model</a:t>
-            </a:r>
-            <a:endParaRPr lang="ru-RU" sz="2400" dirty="0" smtClean="0"/>
-          </a:p>
-          <a:p>
-            <a:pPr marL="800100" lvl="2" indent="0">
-              <a:buNone/>
-            </a:pPr>
-            <a:r>
-              <a:rPr lang="en-US" sz="2000" dirty="0"/>
-              <a:t>Class </a:t>
-            </a:r>
-            <a:r>
-              <a:rPr lang="en-US" sz="2000" dirty="0" err="1" smtClean="0">
-                <a:solidFill>
-                  <a:schemeClr val="accent6">
-                    <a:lumMod val="75000"/>
-                  </a:schemeClr>
-                </a:solidFill>
-              </a:rPr>
-              <a:t>BaseModel</a:t>
-            </a:r>
-            <a:endParaRPr lang="ru-RU" sz="2000" dirty="0" smtClean="0">
-              <a:solidFill>
-                <a:schemeClr val="accent6">
-                  <a:lumMod val="75000"/>
-                </a:schemeClr>
-              </a:solidFill>
-            </a:endParaRPr>
-          </a:p>
-          <a:p>
-            <a:pPr marL="800100" lvl="2" indent="0">
-              <a:buNone/>
-            </a:pPr>
-            <a:endParaRPr lang="ru-RU" sz="2000" dirty="0">
-              <a:solidFill>
-                <a:schemeClr val="accent6">
-                  <a:lumMod val="75000"/>
-                </a:schemeClr>
-              </a:solidFill>
-            </a:endParaRPr>
-          </a:p>
-          <a:p>
-            <a:pPr marL="0" indent="0">
-              <a:buNone/>
-            </a:pPr>
-            <a:r>
-              <a:rPr lang="en-US" sz="2400" strike="sngStrike" dirty="0" err="1" smtClean="0">
-                <a:solidFill>
-                  <a:schemeClr val="accent6">
-                    <a:lumMod val="75000"/>
-                  </a:schemeClr>
-                </a:solidFill>
-              </a:rPr>
-              <a:t>require_once</a:t>
-            </a:r>
-            <a:r>
-              <a:rPr lang="en-US" sz="2400" strike="sngStrike" dirty="0" smtClean="0">
-                <a:solidFill>
-                  <a:schemeClr val="accent6">
-                    <a:lumMod val="75000"/>
-                  </a:schemeClr>
-                </a:solidFill>
-              </a:rPr>
-              <a:t> “</a:t>
-            </a:r>
-            <a:r>
-              <a:rPr lang="en-US" sz="2400" strike="sngStrike" dirty="0" err="1" smtClean="0"/>
-              <a:t>src</a:t>
-            </a:r>
-            <a:r>
-              <a:rPr lang="en-US" sz="2400" strike="sngStrike" dirty="0" smtClean="0"/>
-              <a:t>\</a:t>
-            </a:r>
-            <a:r>
-              <a:rPr lang="en-US" sz="2400" strike="sngStrike" dirty="0" err="1" smtClean="0"/>
-              <a:t>Kuzstu</a:t>
-            </a:r>
-            <a:r>
-              <a:rPr lang="en-US" sz="2400" strike="sngStrike" dirty="0" smtClean="0"/>
-              <a:t>\</a:t>
-            </a:r>
-            <a:r>
-              <a:rPr lang="en-US" sz="2400" strike="sngStrike" dirty="0" err="1" smtClean="0"/>
-              <a:t>BlogBundle</a:t>
-            </a:r>
-            <a:r>
-              <a:rPr lang="en-US" sz="2400" strike="sngStrike" dirty="0" smtClean="0"/>
-              <a:t>\Model</a:t>
-            </a:r>
-            <a:r>
-              <a:rPr lang="ru-RU" sz="2400" strike="sngStrike" dirty="0"/>
-              <a:t>\</a:t>
-            </a:r>
-            <a:r>
-              <a:rPr lang="en-US" sz="2400" strike="sngStrike" dirty="0" err="1" smtClean="0"/>
-              <a:t>BaseModel.php</a:t>
-            </a:r>
-            <a:r>
-              <a:rPr lang="en-US" sz="2400" strike="sngStrike" dirty="0" smtClean="0">
-                <a:solidFill>
-                  <a:schemeClr val="accent6">
-                    <a:lumMod val="75000"/>
-                  </a:schemeClr>
-                </a:solidFill>
-              </a:rPr>
-              <a:t>”</a:t>
-            </a:r>
-          </a:p>
-          <a:p>
-            <a:pPr marL="0" indent="0">
-              <a:buNone/>
-            </a:pPr>
-            <a:r>
-              <a:rPr lang="en-US" sz="2400" dirty="0" smtClean="0">
-                <a:solidFill>
-                  <a:schemeClr val="accent6">
-                    <a:lumMod val="75000"/>
-                  </a:schemeClr>
-                </a:solidFill>
-              </a:rPr>
-              <a:t>$model = new \</a:t>
-            </a:r>
-            <a:r>
-              <a:rPr lang="en-US" sz="2400" dirty="0" err="1" smtClean="0">
-                <a:solidFill>
-                  <a:schemeClr val="accent1"/>
-                </a:solidFill>
-              </a:rPr>
-              <a:t>Kuzstu</a:t>
-            </a:r>
-            <a:r>
-              <a:rPr lang="en-US" sz="2400" dirty="0" smtClean="0">
-                <a:solidFill>
-                  <a:schemeClr val="accent1"/>
-                </a:solidFill>
-              </a:rPr>
-              <a:t>\</a:t>
-            </a:r>
-            <a:r>
-              <a:rPr lang="en-US" sz="2400" dirty="0" err="1" smtClean="0">
-                <a:solidFill>
-                  <a:schemeClr val="accent1"/>
-                </a:solidFill>
-              </a:rPr>
-              <a:t>BlogBundle</a:t>
-            </a:r>
-            <a:r>
-              <a:rPr lang="en-US" sz="2400" dirty="0" smtClean="0">
-                <a:solidFill>
-                  <a:schemeClr val="accent1"/>
-                </a:solidFill>
-              </a:rPr>
-              <a:t>\Model\</a:t>
-            </a:r>
-            <a:r>
-              <a:rPr lang="en-US" sz="2400" dirty="0" err="1" smtClean="0">
-                <a:solidFill>
-                  <a:schemeClr val="accent6">
-                    <a:lumMod val="75000"/>
-                  </a:schemeClr>
-                </a:solidFill>
-              </a:rPr>
-              <a:t>BaseModel</a:t>
-            </a:r>
-            <a:r>
-              <a:rPr lang="ru-RU" sz="2400" dirty="0" smtClean="0">
-                <a:solidFill>
-                  <a:schemeClr val="accent6">
-                    <a:lumMod val="75000"/>
-                  </a:schemeClr>
-                </a:solidFill>
-              </a:rPr>
-              <a:t>()</a:t>
-            </a:r>
-            <a:r>
-              <a:rPr lang="en-US" sz="2400" dirty="0" smtClean="0">
-                <a:solidFill>
-                  <a:schemeClr val="accent6">
-                    <a:lumMod val="75000"/>
-                  </a:schemeClr>
-                </a:solidFill>
-              </a:rPr>
-              <a:t>;</a:t>
-            </a:r>
-            <a:endParaRPr lang="ru-RU" sz="2400" dirty="0" smtClean="0">
-              <a:solidFill>
-                <a:schemeClr val="accent6">
-                  <a:lumMod val="75000"/>
-                </a:schemeClr>
-              </a:solidFill>
-            </a:endParaRPr>
-          </a:p>
-        </p:txBody>
-      </p:sp>
-    </p:spTree>
-    <p:extLst>
-      <p:ext uri="{BB962C8B-B14F-4D97-AF65-F5344CB8AC3E}">
-        <p14:creationId xmlns:p14="http://schemas.microsoft.com/office/powerpoint/2010/main" val="2836123550"/>
       </p:ext>
     </p:extLst>
   </p:cSld>

</xml_diff>